<commit_message>
database and imagelist classes added
</commit_message>
<xml_diff>
--- a/Documentation/sqlite.pptx
+++ b/Documentation/sqlite.pptx
@@ -109,7 +109,72 @@
       </a:defRPr>
     </a:lvl9pPr>
   </p:defaultTextStyle>
+  <p:extLst>
+    <p:ext uri="{EFAFB233-063F-42B5-8137-9DF3F51BA10A}">
+      <p15:sldGuideLst xmlns:p15="http://schemas.microsoft.com/office/powerpoint/2012/main"/>
+    </p:ext>
+  </p:extLst>
 </p:presentation>
+</file>
+
+<file path=ppt/changesInfos/changesInfo1.xml><?xml version="1.0" encoding="utf-8"?>
+<pc:chgInfo xmlns:a="http://schemas.openxmlformats.org/drawingml/2006/main" xmlns:r="http://schemas.openxmlformats.org/officeDocument/2006/relationships" xmlns:ac="http://schemas.microsoft.com/office/drawing/2013/main/command" xmlns:pc="http://schemas.microsoft.com/office/powerpoint/2013/main/command">
+  <pc:docChgLst>
+    <pc:chgData name="Ludwig Sembach" userId="f8993c4f9875f6c3" providerId="LiveId" clId="{0B417544-2E41-4D8B-B0C8-495C71695BCD}"/>
+    <pc:docChg chg="custSel modSld">
+      <pc:chgData name="Ludwig Sembach" userId="f8993c4f9875f6c3" providerId="LiveId" clId="{0B417544-2E41-4D8B-B0C8-495C71695BCD}" dt="2022-01-24T21:24:48.896" v="28" actId="20577"/>
+      <pc:docMkLst>
+        <pc:docMk/>
+      </pc:docMkLst>
+      <pc:sldChg chg="modSp mod">
+        <pc:chgData name="Ludwig Sembach" userId="f8993c4f9875f6c3" providerId="LiveId" clId="{0B417544-2E41-4D8B-B0C8-495C71695BCD}" dt="2022-01-24T21:22:44.522" v="13" actId="20577"/>
+        <pc:sldMkLst>
+          <pc:docMk/>
+          <pc:sldMk cId="750932549" sldId="256"/>
+        </pc:sldMkLst>
+        <pc:spChg chg="mod">
+          <ac:chgData name="Ludwig Sembach" userId="f8993c4f9875f6c3" providerId="LiveId" clId="{0B417544-2E41-4D8B-B0C8-495C71695BCD}" dt="2022-01-24T21:22:44.522" v="13" actId="20577"/>
+          <ac:spMkLst>
+            <pc:docMk/>
+            <pc:sldMk cId="750932549" sldId="256"/>
+            <ac:spMk id="2" creationId="{7E9E1BA3-1236-4CD9-8F3E-CE5D311697B9}"/>
+          </ac:spMkLst>
+        </pc:spChg>
+      </pc:sldChg>
+      <pc:sldChg chg="modSp mod">
+        <pc:chgData name="Ludwig Sembach" userId="f8993c4f9875f6c3" providerId="LiveId" clId="{0B417544-2E41-4D8B-B0C8-495C71695BCD}" dt="2022-01-24T21:24:48.896" v="28" actId="20577"/>
+        <pc:sldMkLst>
+          <pc:docMk/>
+          <pc:sldMk cId="108804874" sldId="257"/>
+        </pc:sldMkLst>
+        <pc:spChg chg="mod">
+          <ac:chgData name="Ludwig Sembach" userId="f8993c4f9875f6c3" providerId="LiveId" clId="{0B417544-2E41-4D8B-B0C8-495C71695BCD}" dt="2022-01-24T21:24:48.896" v="28" actId="20577"/>
+          <ac:spMkLst>
+            <pc:docMk/>
+            <pc:sldMk cId="108804874" sldId="257"/>
+            <ac:spMk id="3" creationId="{C20A7E14-D3A4-43DE-9DB0-2AA5977839FB}"/>
+          </ac:spMkLst>
+        </pc:spChg>
+        <pc:spChg chg="mod">
+          <ac:chgData name="Ludwig Sembach" userId="f8993c4f9875f6c3" providerId="LiveId" clId="{0B417544-2E41-4D8B-B0C8-495C71695BCD}" dt="2022-01-24T21:24:34.156" v="15" actId="20577"/>
+          <ac:spMkLst>
+            <pc:docMk/>
+            <pc:sldMk cId="108804874" sldId="257"/>
+            <ac:spMk id="8" creationId="{84269AD3-F3B3-4F94-938D-C78B42D5582F}"/>
+          </ac:spMkLst>
+        </pc:spChg>
+        <pc:spChg chg="mod">
+          <ac:chgData name="Ludwig Sembach" userId="f8993c4f9875f6c3" providerId="LiveId" clId="{0B417544-2E41-4D8B-B0C8-495C71695BCD}" dt="2022-01-24T21:24:31.423" v="14" actId="20577"/>
+          <ac:spMkLst>
+            <pc:docMk/>
+            <pc:sldMk cId="108804874" sldId="257"/>
+            <ac:spMk id="55" creationId="{0FACD02D-A2C8-460E-9429-A3447391EFDB}"/>
+          </ac:spMkLst>
+        </pc:spChg>
+      </pc:sldChg>
+    </pc:docChg>
+  </pc:docChgLst>
+</pc:chgInfo>
 </file>
 
 <file path=ppt/slideLayouts/slideLayout1.xml><?xml version="1.0" encoding="utf-8"?>
@@ -338,7 +403,7 @@
           <a:p>
             <a:fld id="{96DFF08F-DC6B-4601-B491-B0F83F6DD2DA}" type="datetimeFigureOut">
               <a:rPr lang="en-US" dirty="0"/>
-              <a:t>1/23/2022</a:t>
+              <a:t>1/24/2022</a:t>
             </a:fld>
             <a:endParaRPr lang="en-US" dirty="0"/>
           </a:p>
@@ -541,7 +606,7 @@
           <a:p>
             <a:fld id="{96DFF08F-DC6B-4601-B491-B0F83F6DD2DA}" type="datetimeFigureOut">
               <a:rPr lang="en-US" dirty="0"/>
-              <a:t>1/23/2022</a:t>
+              <a:t>1/24/2022</a:t>
             </a:fld>
             <a:endParaRPr lang="en-US" dirty="0"/>
           </a:p>
@@ -792,7 +857,7 @@
           <a:p>
             <a:fld id="{96DFF08F-DC6B-4601-B491-B0F83F6DD2DA}" type="datetimeFigureOut">
               <a:rPr lang="en-US" dirty="0"/>
-              <a:t>1/23/2022</a:t>
+              <a:t>1/24/2022</a:t>
             </a:fld>
             <a:endParaRPr lang="en-US" dirty="0"/>
           </a:p>
@@ -957,7 +1022,7 @@
           <a:p>
             <a:fld id="{D62CEF3B-A037-46D0-B02C-1428F07E9383}" type="datetimeFigureOut">
               <a:rPr lang="en-US" dirty="0"/>
-              <a:t>1/23/2022</a:t>
+              <a:t>1/24/2022</a:t>
             </a:fld>
             <a:endParaRPr lang="en-US" dirty="0"/>
           </a:p>
@@ -1295,7 +1360,7 @@
           <a:p>
             <a:fld id="{96DFF08F-DC6B-4601-B491-B0F83F6DD2DA}" type="datetimeFigureOut">
               <a:rPr lang="en-US" dirty="0"/>
-              <a:t>1/23/2022</a:t>
+              <a:t>1/24/2022</a:t>
             </a:fld>
             <a:endParaRPr lang="en-US" dirty="0"/>
           </a:p>
@@ -1565,7 +1630,7 @@
           <a:p>
             <a:fld id="{96DFF08F-DC6B-4601-B491-B0F83F6DD2DA}" type="datetimeFigureOut">
               <a:rPr lang="en-US" dirty="0"/>
-              <a:t>1/23/2022</a:t>
+              <a:t>1/24/2022</a:t>
             </a:fld>
             <a:endParaRPr lang="en-US" dirty="0"/>
           </a:p>
@@ -1939,7 +2004,7 @@
           <a:p>
             <a:fld id="{96DFF08F-DC6B-4601-B491-B0F83F6DD2DA}" type="datetimeFigureOut">
               <a:rPr lang="en-US" dirty="0"/>
-              <a:t>1/23/2022</a:t>
+              <a:t>1/24/2022</a:t>
             </a:fld>
             <a:endParaRPr lang="en-US" dirty="0"/>
           </a:p>
@@ -2052,7 +2117,7 @@
           <a:p>
             <a:fld id="{96DFF08F-DC6B-4601-B491-B0F83F6DD2DA}" type="datetimeFigureOut">
               <a:rPr lang="en-US" dirty="0"/>
-              <a:t>1/23/2022</a:t>
+              <a:t>1/24/2022</a:t>
             </a:fld>
             <a:endParaRPr lang="en-US" dirty="0"/>
           </a:p>
@@ -2219,7 +2284,7 @@
             <a:fld id="{96DFF08F-DC6B-4601-B491-B0F83F6DD2DA}" type="datetimeFigureOut">
               <a:rPr lang="en-US" dirty="0"/>
               <a:pPr/>
-              <a:t>1/23/2022</a:t>
+              <a:t>1/24/2022</a:t>
             </a:fld>
             <a:endParaRPr lang="en-US" dirty="0"/>
           </a:p>
@@ -2570,7 +2635,7 @@
             <a:fld id="{96DFF08F-DC6B-4601-B491-B0F83F6DD2DA}" type="datetimeFigureOut">
               <a:rPr lang="en-US" dirty="0"/>
               <a:pPr/>
-              <a:t>1/23/2022</a:t>
+              <a:t>1/24/2022</a:t>
             </a:fld>
             <a:endParaRPr lang="en-US" dirty="0"/>
           </a:p>
@@ -2943,7 +3008,7 @@
           <a:p>
             <a:fld id="{96DFF08F-DC6B-4601-B491-B0F83F6DD2DA}" type="datetimeFigureOut">
               <a:rPr lang="en-US" dirty="0"/>
-              <a:t>1/23/2022</a:t>
+              <a:t>1/24/2022</a:t>
             </a:fld>
             <a:endParaRPr lang="en-US" dirty="0"/>
           </a:p>
@@ -3226,7 +3291,7 @@
             <a:fld id="{96DFF08F-DC6B-4601-B491-B0F83F6DD2DA}" type="datetimeFigureOut">
               <a:rPr lang="en-US" dirty="0"/>
               <a:pPr/>
-              <a:t>1/23/2022</a:t>
+              <a:t>1/24/2022</a:t>
             </a:fld>
             <a:endParaRPr lang="en-US" dirty="0"/>
           </a:p>
@@ -3767,6 +3832,10 @@
           <a:bodyPr/>
           <a:lstStyle/>
           <a:p>
+            <a:r>
+              <a:rPr lang="en-US" dirty="0" err="1"/>
+              <a:t>PicturePerfect</a:t>
+            </a:r>
             <a:endParaRPr lang="en-DE" dirty="0"/>
           </a:p>
         </p:txBody>
@@ -3945,6 +4014,16 @@
               <a:t>Sub-categories</a:t>
             </a:r>
           </a:p>
+          <a:p>
+            <a:pPr lvl="1">
+              <a:buFont typeface="Arial" panose="020B0604020202020204" pitchFamily="34" charset="0"/>
+              <a:buChar char="•"/>
+            </a:pPr>
+            <a:r>
+              <a:rPr lang="en-US" dirty="0"/>
+              <a:t>Locations</a:t>
+            </a:r>
+          </a:p>
         </p:txBody>
       </p:sp>
       <p:sp>
@@ -4094,7 +4173,7 @@
             <a:pPr algn="ctr"/>
             <a:r>
               <a:rPr lang="en-US" dirty="0" err="1"/>
-              <a:t>Images_subcategories</a:t>
+              <a:t>images_subcategories</a:t>
             </a:r>
             <a:endParaRPr lang="en-US" dirty="0"/>
           </a:p>
@@ -4960,7 +5039,7 @@
             <a:pPr algn="ctr"/>
             <a:r>
               <a:rPr lang="en-US" dirty="0" err="1"/>
-              <a:t>Images_locations</a:t>
+              <a:t>images_locations</a:t>
             </a:r>
             <a:endParaRPr lang="en-US" dirty="0"/>
           </a:p>

</xml_diff>

<commit_message>
database column types changed
</commit_message>
<xml_diff>
--- a/Documentation/sqlite.pptx
+++ b/Documentation/sqlite.pptx
@@ -121,8 +121,8 @@
 <pc:chgInfo xmlns:a="http://schemas.openxmlformats.org/drawingml/2006/main" xmlns:r="http://schemas.openxmlformats.org/officeDocument/2006/relationships" xmlns:ac="http://schemas.microsoft.com/office/drawing/2013/main/command" xmlns:pc="http://schemas.microsoft.com/office/powerpoint/2013/main/command">
   <pc:docChgLst>
     <pc:chgData name="Ludwig Sembach" userId="f8993c4f9875f6c3" providerId="LiveId" clId="{0B417544-2E41-4D8B-B0C8-495C71695BCD}"/>
-    <pc:docChg chg="custSel modSld">
-      <pc:chgData name="Ludwig Sembach" userId="f8993c4f9875f6c3" providerId="LiveId" clId="{0B417544-2E41-4D8B-B0C8-495C71695BCD}" dt="2022-01-24T21:24:48.896" v="28" actId="20577"/>
+    <pc:docChg chg="undo custSel modSld">
+      <pc:chgData name="Ludwig Sembach" userId="f8993c4f9875f6c3" providerId="LiveId" clId="{0B417544-2E41-4D8B-B0C8-495C71695BCD}" dt="2022-02-07T22:10:31.233" v="38" actId="20577"/>
       <pc:docMkLst>
         <pc:docMk/>
       </pc:docMkLst>
@@ -172,6 +172,21 @@
           </ac:spMkLst>
         </pc:spChg>
       </pc:sldChg>
+      <pc:sldChg chg="modSp mod">
+        <pc:chgData name="Ludwig Sembach" userId="f8993c4f9875f6c3" providerId="LiveId" clId="{0B417544-2E41-4D8B-B0C8-495C71695BCD}" dt="2022-02-07T22:10:31.233" v="38" actId="20577"/>
+        <pc:sldMkLst>
+          <pc:docMk/>
+          <pc:sldMk cId="2570949189" sldId="258"/>
+        </pc:sldMkLst>
+        <pc:graphicFrameChg chg="modGraphic">
+          <ac:chgData name="Ludwig Sembach" userId="f8993c4f9875f6c3" providerId="LiveId" clId="{0B417544-2E41-4D8B-B0C8-495C71695BCD}" dt="2022-02-07T22:10:31.233" v="38" actId="20577"/>
+          <ac:graphicFrameMkLst>
+            <pc:docMk/>
+            <pc:sldMk cId="2570949189" sldId="258"/>
+            <ac:graphicFrameMk id="4" creationId="{FE190C68-5049-41A7-A11F-A7CBD9EF5145}"/>
+          </ac:graphicFrameMkLst>
+        </pc:graphicFrameChg>
+      </pc:sldChg>
     </pc:docChg>
   </pc:docChgLst>
 </pc:chgInfo>
@@ -403,7 +418,7 @@
           <a:p>
             <a:fld id="{96DFF08F-DC6B-4601-B491-B0F83F6DD2DA}" type="datetimeFigureOut">
               <a:rPr lang="en-US" dirty="0"/>
-              <a:t>1/24/2022</a:t>
+              <a:t>2/7/2022</a:t>
             </a:fld>
             <a:endParaRPr lang="en-US" dirty="0"/>
           </a:p>
@@ -606,7 +621,7 @@
           <a:p>
             <a:fld id="{96DFF08F-DC6B-4601-B491-B0F83F6DD2DA}" type="datetimeFigureOut">
               <a:rPr lang="en-US" dirty="0"/>
-              <a:t>1/24/2022</a:t>
+              <a:t>2/7/2022</a:t>
             </a:fld>
             <a:endParaRPr lang="en-US" dirty="0"/>
           </a:p>
@@ -857,7 +872,7 @@
           <a:p>
             <a:fld id="{96DFF08F-DC6B-4601-B491-B0F83F6DD2DA}" type="datetimeFigureOut">
               <a:rPr lang="en-US" dirty="0"/>
-              <a:t>1/24/2022</a:t>
+              <a:t>2/7/2022</a:t>
             </a:fld>
             <a:endParaRPr lang="en-US" dirty="0"/>
           </a:p>
@@ -1022,7 +1037,7 @@
           <a:p>
             <a:fld id="{D62CEF3B-A037-46D0-B02C-1428F07E9383}" type="datetimeFigureOut">
               <a:rPr lang="en-US" dirty="0"/>
-              <a:t>1/24/2022</a:t>
+              <a:t>2/7/2022</a:t>
             </a:fld>
             <a:endParaRPr lang="en-US" dirty="0"/>
           </a:p>
@@ -1360,7 +1375,7 @@
           <a:p>
             <a:fld id="{96DFF08F-DC6B-4601-B491-B0F83F6DD2DA}" type="datetimeFigureOut">
               <a:rPr lang="en-US" dirty="0"/>
-              <a:t>1/24/2022</a:t>
+              <a:t>2/7/2022</a:t>
             </a:fld>
             <a:endParaRPr lang="en-US" dirty="0"/>
           </a:p>
@@ -1630,7 +1645,7 @@
           <a:p>
             <a:fld id="{96DFF08F-DC6B-4601-B491-B0F83F6DD2DA}" type="datetimeFigureOut">
               <a:rPr lang="en-US" dirty="0"/>
-              <a:t>1/24/2022</a:t>
+              <a:t>2/7/2022</a:t>
             </a:fld>
             <a:endParaRPr lang="en-US" dirty="0"/>
           </a:p>
@@ -2004,7 +2019,7 @@
           <a:p>
             <a:fld id="{96DFF08F-DC6B-4601-B491-B0F83F6DD2DA}" type="datetimeFigureOut">
               <a:rPr lang="en-US" dirty="0"/>
-              <a:t>1/24/2022</a:t>
+              <a:t>2/7/2022</a:t>
             </a:fld>
             <a:endParaRPr lang="en-US" dirty="0"/>
           </a:p>
@@ -2117,7 +2132,7 @@
           <a:p>
             <a:fld id="{96DFF08F-DC6B-4601-B491-B0F83F6DD2DA}" type="datetimeFigureOut">
               <a:rPr lang="en-US" dirty="0"/>
-              <a:t>1/24/2022</a:t>
+              <a:t>2/7/2022</a:t>
             </a:fld>
             <a:endParaRPr lang="en-US" dirty="0"/>
           </a:p>
@@ -2284,7 +2299,7 @@
             <a:fld id="{96DFF08F-DC6B-4601-B491-B0F83F6DD2DA}" type="datetimeFigureOut">
               <a:rPr lang="en-US" dirty="0"/>
               <a:pPr/>
-              <a:t>1/24/2022</a:t>
+              <a:t>2/7/2022</a:t>
             </a:fld>
             <a:endParaRPr lang="en-US" dirty="0"/>
           </a:p>
@@ -2635,7 +2650,7 @@
             <a:fld id="{96DFF08F-DC6B-4601-B491-B0F83F6DD2DA}" type="datetimeFigureOut">
               <a:rPr lang="en-US" dirty="0"/>
               <a:pPr/>
-              <a:t>1/24/2022</a:t>
+              <a:t>2/7/2022</a:t>
             </a:fld>
             <a:endParaRPr lang="en-US" dirty="0"/>
           </a:p>
@@ -3008,7 +3023,7 @@
           <a:p>
             <a:fld id="{96DFF08F-DC6B-4601-B491-B0F83F6DD2DA}" type="datetimeFigureOut">
               <a:rPr lang="en-US" dirty="0"/>
-              <a:t>1/24/2022</a:t>
+              <a:t>2/7/2022</a:t>
             </a:fld>
             <a:endParaRPr lang="en-US" dirty="0"/>
           </a:p>
@@ -3291,7 +3306,7 @@
             <a:fld id="{96DFF08F-DC6B-4601-B491-B0F83F6DD2DA}" type="datetimeFigureOut">
               <a:rPr lang="en-US" dirty="0"/>
               <a:pPr/>
-              <a:t>1/24/2022</a:t>
+              <a:t>2/7/2022</a:t>
             </a:fld>
             <a:endParaRPr lang="en-US" dirty="0"/>
           </a:p>
@@ -5338,7 +5353,7 @@
             <p:ph idx="1"/>
             <p:extLst>
               <p:ext uri="{D42A27DB-BD31-4B8C-83A1-F6EECF244321}">
-                <p14:modId xmlns:p14="http://schemas.microsoft.com/office/powerpoint/2010/main" val="3523070233"/>
+                <p14:modId xmlns:p14="http://schemas.microsoft.com/office/powerpoint/2010/main" val="674087241"/>
               </p:ext>
             </p:extLst>
           </p:nvPr>
@@ -5741,7 +5756,7 @@
                     <a:p>
                       <a:r>
                         <a:rPr lang="en-US" sz="1200" dirty="0"/>
-                        <a:t>double</a:t>
+                        <a:t>int</a:t>
                       </a:r>
                       <a:endParaRPr lang="en-DE" sz="1200" dirty="0"/>
                     </a:p>
@@ -5769,7 +5784,7 @@
                     <a:p>
                       <a:r>
                         <a:rPr lang="en-US" sz="1200" dirty="0"/>
-                        <a:t>string</a:t>
+                        <a:t>int</a:t>
                       </a:r>
                       <a:endParaRPr lang="en-DE" sz="1200" dirty="0"/>
                     </a:p>

</xml_diff>

<commit_message>
displaying and changing location and category implemented
</commit_message>
<xml_diff>
--- a/Documentation/sqlite.pptx
+++ b/Documentation/sqlite.pptx
@@ -120,6 +120,54 @@
 <file path=ppt/changesInfos/changesInfo1.xml><?xml version="1.0" encoding="utf-8"?>
 <pc:chgInfo xmlns:a="http://schemas.openxmlformats.org/drawingml/2006/main" xmlns:r="http://schemas.openxmlformats.org/officeDocument/2006/relationships" xmlns:ac="http://schemas.microsoft.com/office/drawing/2013/main/command" xmlns:pc="http://schemas.microsoft.com/office/powerpoint/2013/main/command">
   <pc:docChgLst>
+    <pc:chgData name="Ludwig Sembach" userId="f8993c4f9875f6c3" providerId="LiveId" clId="{88AB47F5-5207-4E7E-B39C-5DC65B089C56}"/>
+    <pc:docChg chg="undo custSel modSld">
+      <pc:chgData name="Ludwig Sembach" userId="f8993c4f9875f6c3" providerId="LiveId" clId="{88AB47F5-5207-4E7E-B39C-5DC65B089C56}" dt="2022-03-03T20:50:55.499" v="13" actId="14100"/>
+      <pc:docMkLst>
+        <pc:docMk/>
+      </pc:docMkLst>
+      <pc:sldChg chg="addSp modSp mod">
+        <pc:chgData name="Ludwig Sembach" userId="f8993c4f9875f6c3" providerId="LiveId" clId="{88AB47F5-5207-4E7E-B39C-5DC65B089C56}" dt="2022-03-03T20:50:55.499" v="13" actId="14100"/>
+        <pc:sldMkLst>
+          <pc:docMk/>
+          <pc:sldMk cId="108804874" sldId="257"/>
+        </pc:sldMkLst>
+        <pc:spChg chg="add mod">
+          <ac:chgData name="Ludwig Sembach" userId="f8993c4f9875f6c3" providerId="LiveId" clId="{88AB47F5-5207-4E7E-B39C-5DC65B089C56}" dt="2022-03-03T20:50:30.038" v="7" actId="1076"/>
+          <ac:spMkLst>
+            <pc:docMk/>
+            <pc:sldMk cId="108804874" sldId="257"/>
+            <ac:spMk id="26" creationId="{0CFF722C-522A-4A35-B399-858C033A7EB4}"/>
+          </ac:spMkLst>
+        </pc:spChg>
+        <pc:spChg chg="mod">
+          <ac:chgData name="Ludwig Sembach" userId="f8993c4f9875f6c3" providerId="LiveId" clId="{88AB47F5-5207-4E7E-B39C-5DC65B089C56}" dt="2022-03-03T20:50:17.714" v="2" actId="1076"/>
+          <ac:spMkLst>
+            <pc:docMk/>
+            <pc:sldMk cId="108804874" sldId="257"/>
+            <ac:spMk id="37" creationId="{79387EAD-AD0B-4758-B9D7-758B20FB466F}"/>
+          </ac:spMkLst>
+        </pc:spChg>
+        <pc:cxnChg chg="add mod">
+          <ac:chgData name="Ludwig Sembach" userId="f8993c4f9875f6c3" providerId="LiveId" clId="{88AB47F5-5207-4E7E-B39C-5DC65B089C56}" dt="2022-03-03T20:50:43.155" v="10" actId="14100"/>
+          <ac:cxnSpMkLst>
+            <pc:docMk/>
+            <pc:sldMk cId="108804874" sldId="257"/>
+            <ac:cxnSpMk id="27" creationId="{E23AA5BC-3551-4623-BD60-047CE6E3ECDF}"/>
+          </ac:cxnSpMkLst>
+        </pc:cxnChg>
+        <pc:cxnChg chg="add mod">
+          <ac:chgData name="Ludwig Sembach" userId="f8993c4f9875f6c3" providerId="LiveId" clId="{88AB47F5-5207-4E7E-B39C-5DC65B089C56}" dt="2022-03-03T20:50:55.499" v="13" actId="14100"/>
+          <ac:cxnSpMkLst>
+            <pc:docMk/>
+            <pc:sldMk cId="108804874" sldId="257"/>
+            <ac:cxnSpMk id="28" creationId="{D9A4740C-00DC-42E3-BFF4-E0199D9A1EDE}"/>
+          </ac:cxnSpMkLst>
+        </pc:cxnChg>
+      </pc:sldChg>
+    </pc:docChg>
+  </pc:docChgLst>
+  <pc:docChgLst>
     <pc:chgData name="Ludwig Sembach" userId="f8993c4f9875f6c3" providerId="LiveId" clId="{0B417544-2E41-4D8B-B0C8-495C71695BCD}"/>
     <pc:docChg chg="undo custSel modSld">
       <pc:chgData name="Ludwig Sembach" userId="f8993c4f9875f6c3" providerId="LiveId" clId="{0B417544-2E41-4D8B-B0C8-495C71695BCD}" dt="2022-02-09T20:14:19.847" v="60" actId="20577"/>
@@ -418,7 +466,7 @@
           <a:p>
             <a:fld id="{96DFF08F-DC6B-4601-B491-B0F83F6DD2DA}" type="datetimeFigureOut">
               <a:rPr lang="en-US" dirty="0"/>
-              <a:t>2/9/2022</a:t>
+              <a:t>3/3/2022</a:t>
             </a:fld>
             <a:endParaRPr lang="en-US" dirty="0"/>
           </a:p>
@@ -621,7 +669,7 @@
           <a:p>
             <a:fld id="{96DFF08F-DC6B-4601-B491-B0F83F6DD2DA}" type="datetimeFigureOut">
               <a:rPr lang="en-US" dirty="0"/>
-              <a:t>2/9/2022</a:t>
+              <a:t>3/3/2022</a:t>
             </a:fld>
             <a:endParaRPr lang="en-US" dirty="0"/>
           </a:p>
@@ -872,7 +920,7 @@
           <a:p>
             <a:fld id="{96DFF08F-DC6B-4601-B491-B0F83F6DD2DA}" type="datetimeFigureOut">
               <a:rPr lang="en-US" dirty="0"/>
-              <a:t>2/9/2022</a:t>
+              <a:t>3/3/2022</a:t>
             </a:fld>
             <a:endParaRPr lang="en-US" dirty="0"/>
           </a:p>
@@ -1037,7 +1085,7 @@
           <a:p>
             <a:fld id="{D62CEF3B-A037-46D0-B02C-1428F07E9383}" type="datetimeFigureOut">
               <a:rPr lang="en-US" dirty="0"/>
-              <a:t>2/9/2022</a:t>
+              <a:t>3/3/2022</a:t>
             </a:fld>
             <a:endParaRPr lang="en-US" dirty="0"/>
           </a:p>
@@ -1375,7 +1423,7 @@
           <a:p>
             <a:fld id="{96DFF08F-DC6B-4601-B491-B0F83F6DD2DA}" type="datetimeFigureOut">
               <a:rPr lang="en-US" dirty="0"/>
-              <a:t>2/9/2022</a:t>
+              <a:t>3/3/2022</a:t>
             </a:fld>
             <a:endParaRPr lang="en-US" dirty="0"/>
           </a:p>
@@ -1645,7 +1693,7 @@
           <a:p>
             <a:fld id="{96DFF08F-DC6B-4601-B491-B0F83F6DD2DA}" type="datetimeFigureOut">
               <a:rPr lang="en-US" dirty="0"/>
-              <a:t>2/9/2022</a:t>
+              <a:t>3/3/2022</a:t>
             </a:fld>
             <a:endParaRPr lang="en-US" dirty="0"/>
           </a:p>
@@ -2019,7 +2067,7 @@
           <a:p>
             <a:fld id="{96DFF08F-DC6B-4601-B491-B0F83F6DD2DA}" type="datetimeFigureOut">
               <a:rPr lang="en-US" dirty="0"/>
-              <a:t>2/9/2022</a:t>
+              <a:t>3/3/2022</a:t>
             </a:fld>
             <a:endParaRPr lang="en-US" dirty="0"/>
           </a:p>
@@ -2132,7 +2180,7 @@
           <a:p>
             <a:fld id="{96DFF08F-DC6B-4601-B491-B0F83F6DD2DA}" type="datetimeFigureOut">
               <a:rPr lang="en-US" dirty="0"/>
-              <a:t>2/9/2022</a:t>
+              <a:t>3/3/2022</a:t>
             </a:fld>
             <a:endParaRPr lang="en-US" dirty="0"/>
           </a:p>
@@ -2299,7 +2347,7 @@
             <a:fld id="{96DFF08F-DC6B-4601-B491-B0F83F6DD2DA}" type="datetimeFigureOut">
               <a:rPr lang="en-US" dirty="0"/>
               <a:pPr/>
-              <a:t>2/9/2022</a:t>
+              <a:t>3/3/2022</a:t>
             </a:fld>
             <a:endParaRPr lang="en-US" dirty="0"/>
           </a:p>
@@ -2650,7 +2698,7 @@
             <a:fld id="{96DFF08F-DC6B-4601-B491-B0F83F6DD2DA}" type="datetimeFigureOut">
               <a:rPr lang="en-US" dirty="0"/>
               <a:pPr/>
-              <a:t>2/9/2022</a:t>
+              <a:t>3/3/2022</a:t>
             </a:fld>
             <a:endParaRPr lang="en-US" dirty="0"/>
           </a:p>
@@ -3023,7 +3071,7 @@
           <a:p>
             <a:fld id="{96DFF08F-DC6B-4601-B491-B0F83F6DD2DA}" type="datetimeFigureOut">
               <a:rPr lang="en-US" dirty="0"/>
-              <a:t>2/9/2022</a:t>
+              <a:t>3/3/2022</a:t>
             </a:fld>
             <a:endParaRPr lang="en-US" dirty="0"/>
           </a:p>
@@ -3306,7 +3354,7 @@
             <a:fld id="{96DFF08F-DC6B-4601-B491-B0F83F6DD2DA}" type="datetimeFigureOut">
               <a:rPr lang="en-US" dirty="0"/>
               <a:pPr/>
-              <a:t>2/9/2022</a:t>
+              <a:t>3/3/2022</a:t>
             </a:fld>
             <a:endParaRPr lang="en-US" dirty="0"/>
           </a:p>
@@ -5278,6 +5326,133 @@
           </a:p>
         </p:txBody>
       </p:sp>
+      <p:sp>
+        <p:nvSpPr>
+          <p:cNvPr id="26" name="TextBox 25">
+            <a:extLst>
+              <a:ext uri="{FF2B5EF4-FFF2-40B4-BE49-F238E27FC236}">
+                <a16:creationId xmlns:a16="http://schemas.microsoft.com/office/drawing/2014/main" id="{0CFF722C-522A-4A35-B399-858C033A7EB4}"/>
+              </a:ext>
+            </a:extLst>
+          </p:cNvPr>
+          <p:cNvSpPr txBox="1"/>
+          <p:nvPr/>
+        </p:nvSpPr>
+        <p:spPr>
+          <a:xfrm flipH="1">
+            <a:off x="1682194" y="4509064"/>
+            <a:ext cx="1908895" cy="369332"/>
+          </a:xfrm>
+          <a:prstGeom prst="rect">
+            <a:avLst/>
+          </a:prstGeom>
+          <a:solidFill>
+            <a:schemeClr val="accent6"/>
+          </a:solidFill>
+        </p:spPr>
+        <p:txBody>
+          <a:bodyPr wrap="square" rtlCol="0">
+            <a:spAutoFit/>
+          </a:bodyPr>
+          <a:lstStyle/>
+          <a:p>
+            <a:pPr algn="ctr"/>
+            <a:r>
+              <a:rPr lang="en-US" dirty="0" err="1"/>
+              <a:t>images_categories</a:t>
+            </a:r>
+            <a:endParaRPr lang="en-US" dirty="0"/>
+          </a:p>
+        </p:txBody>
+      </p:sp>
+      <p:cxnSp>
+        <p:nvCxnSpPr>
+          <p:cNvPr id="27" name="Straight Connector 26">
+            <a:extLst>
+              <a:ext uri="{FF2B5EF4-FFF2-40B4-BE49-F238E27FC236}">
+                <a16:creationId xmlns:a16="http://schemas.microsoft.com/office/drawing/2014/main" id="{E23AA5BC-3551-4623-BD60-047CE6E3ECDF}"/>
+              </a:ext>
+            </a:extLst>
+          </p:cNvPr>
+          <p:cNvCxnSpPr>
+            <a:cxnSpLocks/>
+            <a:stCxn id="7" idx="3"/>
+            <a:endCxn id="26" idx="1"/>
+          </p:cNvCxnSpPr>
+          <p:nvPr/>
+        </p:nvCxnSpPr>
+        <p:spPr>
+          <a:xfrm flipH="1">
+            <a:off x="3591089" y="4689417"/>
+            <a:ext cx="830496" cy="4313"/>
+          </a:xfrm>
+          <a:prstGeom prst="line">
+            <a:avLst/>
+          </a:prstGeom>
+          <a:ln>
+            <a:headEnd type="none" w="med" len="med"/>
+            <a:tailEnd type="triangle" w="med" len="med"/>
+          </a:ln>
+        </p:spPr>
+        <p:style>
+          <a:lnRef idx="2">
+            <a:schemeClr val="dk1"/>
+          </a:lnRef>
+          <a:fillRef idx="0">
+            <a:schemeClr val="dk1"/>
+          </a:fillRef>
+          <a:effectRef idx="1">
+            <a:schemeClr val="dk1"/>
+          </a:effectRef>
+          <a:fontRef idx="minor">
+            <a:schemeClr val="tx1"/>
+          </a:fontRef>
+        </p:style>
+      </p:cxnSp>
+      <p:cxnSp>
+        <p:nvCxnSpPr>
+          <p:cNvPr id="28" name="Straight Connector 27">
+            <a:extLst>
+              <a:ext uri="{FF2B5EF4-FFF2-40B4-BE49-F238E27FC236}">
+                <a16:creationId xmlns:a16="http://schemas.microsoft.com/office/drawing/2014/main" id="{D9A4740C-00DC-42E3-BFF4-E0199D9A1EDE}"/>
+              </a:ext>
+            </a:extLst>
+          </p:cNvPr>
+          <p:cNvCxnSpPr>
+            <a:cxnSpLocks/>
+            <a:stCxn id="4" idx="3"/>
+            <a:endCxn id="26" idx="0"/>
+          </p:cNvCxnSpPr>
+          <p:nvPr/>
+        </p:nvCxnSpPr>
+        <p:spPr>
+          <a:xfrm flipH="1">
+            <a:off x="2636641" y="2863553"/>
+            <a:ext cx="1784944" cy="1645511"/>
+          </a:xfrm>
+          <a:prstGeom prst="line">
+            <a:avLst/>
+          </a:prstGeom>
+          <a:ln>
+            <a:headEnd type="none" w="med" len="med"/>
+            <a:tailEnd type="triangle" w="med" len="med"/>
+          </a:ln>
+        </p:spPr>
+        <p:style>
+          <a:lnRef idx="2">
+            <a:schemeClr val="dk1"/>
+          </a:lnRef>
+          <a:fillRef idx="0">
+            <a:schemeClr val="dk1"/>
+          </a:fillRef>
+          <a:effectRef idx="1">
+            <a:schemeClr val="dk1"/>
+          </a:effectRef>
+          <a:fontRef idx="minor">
+            <a:schemeClr val="tx1"/>
+          </a:fontRef>
+        </p:style>
+      </p:cxnSp>
     </p:spTree>
     <p:extLst>
       <p:ext uri="{BB962C8B-B14F-4D97-AF65-F5344CB8AC3E}">

</xml_diff>

<commit_message>
info table added to database
</commit_message>
<xml_diff>
--- a/Documentation/sqlite.pptx
+++ b/Documentation/sqlite.pptx
@@ -237,6 +237,30 @@
       </pc:sldChg>
     </pc:docChg>
   </pc:docChgLst>
+  <pc:docChgLst>
+    <pc:chgData name="Ludwig Sembach" userId="f8993c4f9875f6c3" providerId="LiveId" clId="{5BF45BE6-ED48-4068-A4AD-A7A30674D439}"/>
+    <pc:docChg chg="modSld">
+      <pc:chgData name="Ludwig Sembach" userId="f8993c4f9875f6c3" providerId="LiveId" clId="{5BF45BE6-ED48-4068-A4AD-A7A30674D439}" dt="2022-04-16T18:20:31.305" v="0" actId="20577"/>
+      <pc:docMkLst>
+        <pc:docMk/>
+      </pc:docMkLst>
+      <pc:sldChg chg="modSp mod">
+        <pc:chgData name="Ludwig Sembach" userId="f8993c4f9875f6c3" providerId="LiveId" clId="{5BF45BE6-ED48-4068-A4AD-A7A30674D439}" dt="2022-04-16T18:20:31.305" v="0" actId="20577"/>
+        <pc:sldMkLst>
+          <pc:docMk/>
+          <pc:sldMk cId="2570949189" sldId="258"/>
+        </pc:sldMkLst>
+        <pc:graphicFrameChg chg="modGraphic">
+          <ac:chgData name="Ludwig Sembach" userId="f8993c4f9875f6c3" providerId="LiveId" clId="{5BF45BE6-ED48-4068-A4AD-A7A30674D439}" dt="2022-04-16T18:20:31.305" v="0" actId="20577"/>
+          <ac:graphicFrameMkLst>
+            <pc:docMk/>
+            <pc:sldMk cId="2570949189" sldId="258"/>
+            <ac:graphicFrameMk id="4" creationId="{FE190C68-5049-41A7-A11F-A7CBD9EF5145}"/>
+          </ac:graphicFrameMkLst>
+        </pc:graphicFrameChg>
+      </pc:sldChg>
+    </pc:docChg>
+  </pc:docChgLst>
 </pc:chgInfo>
 </file>
 
@@ -466,7 +490,7 @@
           <a:p>
             <a:fld id="{96DFF08F-DC6B-4601-B491-B0F83F6DD2DA}" type="datetimeFigureOut">
               <a:rPr lang="en-US" dirty="0"/>
-              <a:t>3/3/2022</a:t>
+              <a:t>4/16/2022</a:t>
             </a:fld>
             <a:endParaRPr lang="en-US" dirty="0"/>
           </a:p>
@@ -669,7 +693,7 @@
           <a:p>
             <a:fld id="{96DFF08F-DC6B-4601-B491-B0F83F6DD2DA}" type="datetimeFigureOut">
               <a:rPr lang="en-US" dirty="0"/>
-              <a:t>3/3/2022</a:t>
+              <a:t>4/16/2022</a:t>
             </a:fld>
             <a:endParaRPr lang="en-US" dirty="0"/>
           </a:p>
@@ -920,7 +944,7 @@
           <a:p>
             <a:fld id="{96DFF08F-DC6B-4601-B491-B0F83F6DD2DA}" type="datetimeFigureOut">
               <a:rPr lang="en-US" dirty="0"/>
-              <a:t>3/3/2022</a:t>
+              <a:t>4/16/2022</a:t>
             </a:fld>
             <a:endParaRPr lang="en-US" dirty="0"/>
           </a:p>
@@ -1085,7 +1109,7 @@
           <a:p>
             <a:fld id="{D62CEF3B-A037-46D0-B02C-1428F07E9383}" type="datetimeFigureOut">
               <a:rPr lang="en-US" dirty="0"/>
-              <a:t>3/3/2022</a:t>
+              <a:t>4/16/2022</a:t>
             </a:fld>
             <a:endParaRPr lang="en-US" dirty="0"/>
           </a:p>
@@ -1423,7 +1447,7 @@
           <a:p>
             <a:fld id="{96DFF08F-DC6B-4601-B491-B0F83F6DD2DA}" type="datetimeFigureOut">
               <a:rPr lang="en-US" dirty="0"/>
-              <a:t>3/3/2022</a:t>
+              <a:t>4/16/2022</a:t>
             </a:fld>
             <a:endParaRPr lang="en-US" dirty="0"/>
           </a:p>
@@ -1693,7 +1717,7 @@
           <a:p>
             <a:fld id="{96DFF08F-DC6B-4601-B491-B0F83F6DD2DA}" type="datetimeFigureOut">
               <a:rPr lang="en-US" dirty="0"/>
-              <a:t>3/3/2022</a:t>
+              <a:t>4/16/2022</a:t>
             </a:fld>
             <a:endParaRPr lang="en-US" dirty="0"/>
           </a:p>
@@ -2067,7 +2091,7 @@
           <a:p>
             <a:fld id="{96DFF08F-DC6B-4601-B491-B0F83F6DD2DA}" type="datetimeFigureOut">
               <a:rPr lang="en-US" dirty="0"/>
-              <a:t>3/3/2022</a:t>
+              <a:t>4/16/2022</a:t>
             </a:fld>
             <a:endParaRPr lang="en-US" dirty="0"/>
           </a:p>
@@ -2180,7 +2204,7 @@
           <a:p>
             <a:fld id="{96DFF08F-DC6B-4601-B491-B0F83F6DD2DA}" type="datetimeFigureOut">
               <a:rPr lang="en-US" dirty="0"/>
-              <a:t>3/3/2022</a:t>
+              <a:t>4/16/2022</a:t>
             </a:fld>
             <a:endParaRPr lang="en-US" dirty="0"/>
           </a:p>
@@ -2347,7 +2371,7 @@
             <a:fld id="{96DFF08F-DC6B-4601-B491-B0F83F6DD2DA}" type="datetimeFigureOut">
               <a:rPr lang="en-US" dirty="0"/>
               <a:pPr/>
-              <a:t>3/3/2022</a:t>
+              <a:t>4/16/2022</a:t>
             </a:fld>
             <a:endParaRPr lang="en-US" dirty="0"/>
           </a:p>
@@ -2698,7 +2722,7 @@
             <a:fld id="{96DFF08F-DC6B-4601-B491-B0F83F6DD2DA}" type="datetimeFigureOut">
               <a:rPr lang="en-US" dirty="0"/>
               <a:pPr/>
-              <a:t>3/3/2022</a:t>
+              <a:t>4/16/2022</a:t>
             </a:fld>
             <a:endParaRPr lang="en-US" dirty="0"/>
           </a:p>
@@ -3071,7 +3095,7 @@
           <a:p>
             <a:fld id="{96DFF08F-DC6B-4601-B491-B0F83F6DD2DA}" type="datetimeFigureOut">
               <a:rPr lang="en-US" dirty="0"/>
-              <a:t>3/3/2022</a:t>
+              <a:t>4/16/2022</a:t>
             </a:fld>
             <a:endParaRPr lang="en-US" dirty="0"/>
           </a:p>
@@ -3354,7 +3378,7 @@
             <a:fld id="{96DFF08F-DC6B-4601-B491-B0F83F6DD2DA}" type="datetimeFigureOut">
               <a:rPr lang="en-US" dirty="0"/>
               <a:pPr/>
-              <a:t>3/3/2022</a:t>
+              <a:t>4/16/2022</a:t>
             </a:fld>
             <a:endParaRPr lang="en-US" dirty="0"/>
           </a:p>
@@ -5528,7 +5552,7 @@
             <p:ph idx="1"/>
             <p:extLst>
               <p:ext uri="{D42A27DB-BD31-4B8C-83A1-F6EECF244321}">
-                <p14:modId xmlns:p14="http://schemas.microsoft.com/office/powerpoint/2010/main" val="3128010549"/>
+                <p14:modId xmlns:p14="http://schemas.microsoft.com/office/powerpoint/2010/main" val="3099022421"/>
               </p:ext>
             </p:extLst>
           </p:nvPr>
@@ -5776,8 +5800,8 @@
                     <a:lstStyle/>
                     <a:p>
                       <a:r>
-                        <a:rPr lang="en-US" sz="1200" dirty="0"/>
-                        <a:t>f-stop</a:t>
+                        <a:rPr lang="en-US" sz="1200"/>
+                        <a:t>fstop</a:t>
                       </a:r>
                       <a:endParaRPr lang="en-DE" sz="1200" dirty="0"/>
                     </a:p>

</xml_diff>